<commit_message>
update URL in tips PPTX
</commit_message>
<xml_diff>
--- a/Jira Epic Thoughts and Jira Agile Tips and Tricks 1.pptx
+++ b/Jira Epic Thoughts and Jira Agile Tips and Tricks 1.pptx
@@ -3222,8 +3222,11 @@
               <a:rPr lang="en-US" sz="2025" b="1" dirty="0">
                 <a:hlinkClick r:id="rId2"/>
               </a:rPr>
-              <a:t>https://github.com/bobk/azurejirametrics</a:t>
-            </a:r>
+              <a:t>https://github.com/bobk/jirapresentations</a:t>
+            </a:r>
+            <a:br>
+              <a:rPr lang="en-US" sz="2025" b="1" dirty="0"/>
+            </a:br>
             <a:br>
               <a:rPr lang="en-US" sz="1650" b="1" dirty="0"/>
             </a:br>

</xml_diff>

<commit_message>
JIRAMETRICS-7 touched for GitHub Jira reference
</commit_message>
<xml_diff>
--- a/Jira Epic Thoughts and Jira Agile Tips and Tricks 1.pptx
+++ b/Jira Epic Thoughts and Jira Agile Tips and Tricks 1.pptx
@@ -318,7 +318,7 @@
           <a:p>
             <a:fld id="{799B01D3-E541-42FD-B1E6-9E7097F8E480}" type="datetimeFigureOut">
               <a:rPr lang="en-US" smtClean="0"/>
-              <a:t>11/23/2019</a:t>
+              <a:t>11/24/2019</a:t>
             </a:fld>
             <a:endParaRPr lang="en-US"/>
           </a:p>
@@ -486,7 +486,7 @@
           <a:p>
             <a:fld id="{799B01D3-E541-42FD-B1E6-9E7097F8E480}" type="datetimeFigureOut">
               <a:rPr lang="en-US" smtClean="0"/>
-              <a:t>11/23/2019</a:t>
+              <a:t>11/24/2019</a:t>
             </a:fld>
             <a:endParaRPr lang="en-US"/>
           </a:p>
@@ -664,7 +664,7 @@
           <a:p>
             <a:fld id="{799B01D3-E541-42FD-B1E6-9E7097F8E480}" type="datetimeFigureOut">
               <a:rPr lang="en-US" smtClean="0"/>
-              <a:t>11/23/2019</a:t>
+              <a:t>11/24/2019</a:t>
             </a:fld>
             <a:endParaRPr lang="en-US"/>
           </a:p>
@@ -816,7 +816,7 @@
           <a:p>
             <a:fld id="{799B01D3-E541-42FD-B1E6-9E7097F8E480}" type="datetimeFigureOut">
               <a:rPr lang="en-US" smtClean="0"/>
-              <a:t>11/23/2019</a:t>
+              <a:t>11/24/2019</a:t>
             </a:fld>
             <a:endParaRPr lang="en-US"/>
           </a:p>
@@ -1101,7 +1101,7 @@
           <a:p>
             <a:fld id="{799B01D3-E541-42FD-B1E6-9E7097F8E480}" type="datetimeFigureOut">
               <a:rPr lang="en-US" smtClean="0"/>
-              <a:t>11/23/2019</a:t>
+              <a:t>11/24/2019</a:t>
             </a:fld>
             <a:endParaRPr lang="en-US"/>
           </a:p>
@@ -1386,7 +1386,7 @@
           <a:p>
             <a:fld id="{799B01D3-E541-42FD-B1E6-9E7097F8E480}" type="datetimeFigureOut">
               <a:rPr lang="en-US" smtClean="0"/>
-              <a:t>11/23/2019</a:t>
+              <a:t>11/24/2019</a:t>
             </a:fld>
             <a:endParaRPr lang="en-US"/>
           </a:p>
@@ -1805,7 +1805,7 @@
           <a:p>
             <a:fld id="{799B01D3-E541-42FD-B1E6-9E7097F8E480}" type="datetimeFigureOut">
               <a:rPr lang="en-US" smtClean="0"/>
-              <a:t>11/23/2019</a:t>
+              <a:t>11/24/2019</a:t>
             </a:fld>
             <a:endParaRPr lang="en-US"/>
           </a:p>
@@ -1922,7 +1922,7 @@
           <a:p>
             <a:fld id="{799B01D3-E541-42FD-B1E6-9E7097F8E480}" type="datetimeFigureOut">
               <a:rPr lang="en-US" smtClean="0"/>
-              <a:t>11/23/2019</a:t>
+              <a:t>11/24/2019</a:t>
             </a:fld>
             <a:endParaRPr lang="en-US"/>
           </a:p>
@@ -2017,7 +2017,7 @@
           <a:p>
             <a:fld id="{799B01D3-E541-42FD-B1E6-9E7097F8E480}" type="datetimeFigureOut">
               <a:rPr lang="en-US" smtClean="0"/>
-              <a:t>11/23/2019</a:t>
+              <a:t>11/24/2019</a:t>
             </a:fld>
             <a:endParaRPr lang="en-US"/>
           </a:p>
@@ -2292,7 +2292,7 @@
           <a:p>
             <a:fld id="{799B01D3-E541-42FD-B1E6-9E7097F8E480}" type="datetimeFigureOut">
               <a:rPr lang="en-US" smtClean="0"/>
-              <a:t>11/23/2019</a:t>
+              <a:t>11/24/2019</a:t>
             </a:fld>
             <a:endParaRPr lang="en-US"/>
           </a:p>
@@ -2544,7 +2544,7 @@
           <a:p>
             <a:fld id="{799B01D3-E541-42FD-B1E6-9E7097F8E480}" type="datetimeFigureOut">
               <a:rPr lang="en-US" smtClean="0"/>
-              <a:t>11/23/2019</a:t>
+              <a:t>11/24/2019</a:t>
             </a:fld>
             <a:endParaRPr lang="en-US"/>
           </a:p>
@@ -2755,7 +2755,7 @@
           <a:p>
             <a:fld id="{799B01D3-E541-42FD-B1E6-9E7097F8E480}" type="datetimeFigureOut">
               <a:rPr lang="en-US" smtClean="0"/>
-              <a:t>11/23/2019</a:t>
+              <a:t>11/24/2019</a:t>
             </a:fld>
             <a:endParaRPr lang="en-US"/>
           </a:p>
@@ -3222,7 +3222,13 @@
               <a:rPr lang="en-US" sz="2025" b="1" dirty="0">
                 <a:hlinkClick r:id="rId2"/>
               </a:rPr>
-              <a:t>https://github.com/bobk/jirapresentations</a:t>
+              <a:t>https://github.com/bobk</a:t>
+            </a:r>
+            <a:r>
+              <a:rPr lang="en-US" sz="2025" b="1">
+                <a:hlinkClick r:id="rId2"/>
+              </a:rPr>
+              <a:t>/jirapresentations</a:t>
             </a:r>
             <a:br>
               <a:rPr lang="en-US" sz="2025" b="1" dirty="0"/>

</xml_diff>

<commit_message>
JIRAMETRICS-7 additional small text tweaks
</commit_message>
<xml_diff>
--- a/Jira Epic Thoughts and Jira Agile Tips and Tricks 1.pptx
+++ b/Jira Epic Thoughts and Jira Agile Tips and Tricks 1.pptx
@@ -318,7 +318,7 @@
           <a:p>
             <a:fld id="{799B01D3-E541-42FD-B1E6-9E7097F8E480}" type="datetimeFigureOut">
               <a:rPr lang="en-US" smtClean="0"/>
-              <a:t>11/24/2019</a:t>
+              <a:t>11/26/2019</a:t>
             </a:fld>
             <a:endParaRPr lang="en-US"/>
           </a:p>
@@ -486,7 +486,7 @@
           <a:p>
             <a:fld id="{799B01D3-E541-42FD-B1E6-9E7097F8E480}" type="datetimeFigureOut">
               <a:rPr lang="en-US" smtClean="0"/>
-              <a:t>11/24/2019</a:t>
+              <a:t>11/26/2019</a:t>
             </a:fld>
             <a:endParaRPr lang="en-US"/>
           </a:p>
@@ -664,7 +664,7 @@
           <a:p>
             <a:fld id="{799B01D3-E541-42FD-B1E6-9E7097F8E480}" type="datetimeFigureOut">
               <a:rPr lang="en-US" smtClean="0"/>
-              <a:t>11/24/2019</a:t>
+              <a:t>11/26/2019</a:t>
             </a:fld>
             <a:endParaRPr lang="en-US"/>
           </a:p>
@@ -816,7 +816,7 @@
           <a:p>
             <a:fld id="{799B01D3-E541-42FD-B1E6-9E7097F8E480}" type="datetimeFigureOut">
               <a:rPr lang="en-US" smtClean="0"/>
-              <a:t>11/24/2019</a:t>
+              <a:t>11/26/2019</a:t>
             </a:fld>
             <a:endParaRPr lang="en-US"/>
           </a:p>
@@ -1101,7 +1101,7 @@
           <a:p>
             <a:fld id="{799B01D3-E541-42FD-B1E6-9E7097F8E480}" type="datetimeFigureOut">
               <a:rPr lang="en-US" smtClean="0"/>
-              <a:t>11/24/2019</a:t>
+              <a:t>11/26/2019</a:t>
             </a:fld>
             <a:endParaRPr lang="en-US"/>
           </a:p>
@@ -1386,7 +1386,7 @@
           <a:p>
             <a:fld id="{799B01D3-E541-42FD-B1E6-9E7097F8E480}" type="datetimeFigureOut">
               <a:rPr lang="en-US" smtClean="0"/>
-              <a:t>11/24/2019</a:t>
+              <a:t>11/26/2019</a:t>
             </a:fld>
             <a:endParaRPr lang="en-US"/>
           </a:p>
@@ -1805,7 +1805,7 @@
           <a:p>
             <a:fld id="{799B01D3-E541-42FD-B1E6-9E7097F8E480}" type="datetimeFigureOut">
               <a:rPr lang="en-US" smtClean="0"/>
-              <a:t>11/24/2019</a:t>
+              <a:t>11/26/2019</a:t>
             </a:fld>
             <a:endParaRPr lang="en-US"/>
           </a:p>
@@ -1922,7 +1922,7 @@
           <a:p>
             <a:fld id="{799B01D3-E541-42FD-B1E6-9E7097F8E480}" type="datetimeFigureOut">
               <a:rPr lang="en-US" smtClean="0"/>
-              <a:t>11/24/2019</a:t>
+              <a:t>11/26/2019</a:t>
             </a:fld>
             <a:endParaRPr lang="en-US"/>
           </a:p>
@@ -2017,7 +2017,7 @@
           <a:p>
             <a:fld id="{799B01D3-E541-42FD-B1E6-9E7097F8E480}" type="datetimeFigureOut">
               <a:rPr lang="en-US" smtClean="0"/>
-              <a:t>11/24/2019</a:t>
+              <a:t>11/26/2019</a:t>
             </a:fld>
             <a:endParaRPr lang="en-US"/>
           </a:p>
@@ -2292,7 +2292,7 @@
           <a:p>
             <a:fld id="{799B01D3-E541-42FD-B1E6-9E7097F8E480}" type="datetimeFigureOut">
               <a:rPr lang="en-US" smtClean="0"/>
-              <a:t>11/24/2019</a:t>
+              <a:t>11/26/2019</a:t>
             </a:fld>
             <a:endParaRPr lang="en-US"/>
           </a:p>
@@ -2544,7 +2544,7 @@
           <a:p>
             <a:fld id="{799B01D3-E541-42FD-B1E6-9E7097F8E480}" type="datetimeFigureOut">
               <a:rPr lang="en-US" smtClean="0"/>
-              <a:t>11/24/2019</a:t>
+              <a:t>11/26/2019</a:t>
             </a:fld>
             <a:endParaRPr lang="en-US"/>
           </a:p>
@@ -2755,7 +2755,7 @@
           <a:p>
             <a:fld id="{799B01D3-E541-42FD-B1E6-9E7097F8E480}" type="datetimeFigureOut">
               <a:rPr lang="en-US" smtClean="0"/>
-              <a:t>11/24/2019</a:t>
+              <a:t>11/26/2019</a:t>
             </a:fld>
             <a:endParaRPr lang="en-US"/>
           </a:p>
@@ -4124,7 +4124,7 @@
         <p:spPr/>
         <p:txBody>
           <a:bodyPr>
-            <a:normAutofit fontScale="92500"/>
+            <a:normAutofit fontScale="92500" lnSpcReduction="10000"/>
           </a:bodyPr>
           <a:lstStyle/>
           <a:p>
@@ -4185,7 +4185,22 @@
               </a:rPr>
               <a:t>http://&lt;INSTANCE&gt;/rest/api/2/status</a:t>
             </a:r>
-            <a:endParaRPr lang="en-US" sz="1800" dirty="0"/>
+            <a:r>
+              <a:rPr lang="en-US" sz="1800" dirty="0"/>
+              <a:t> </a:t>
+            </a:r>
+            <a:r>
+              <a:rPr lang="en-US" sz="2400" dirty="0"/>
+              <a:t>(you can get this via </a:t>
+            </a:r>
+            <a:r>
+              <a:rPr lang="en-US" sz="2400" dirty="0" err="1"/>
+              <a:t>jira.statuses</a:t>
+            </a:r>
+            <a:r>
+              <a:rPr lang="en-US" sz="2400" dirty="0"/>
+              <a:t>() )</a:t>
+            </a:r>
           </a:p>
           <a:p>
             <a:r>
@@ -4887,7 +4902,7 @@
         </p:nvSpPr>
         <p:spPr>
           <a:xfrm>
-            <a:off x="457200" y="1600200"/>
+            <a:off x="457200" y="1371600"/>
             <a:ext cx="8229600" cy="4876800"/>
           </a:xfrm>
         </p:spPr>
@@ -4905,6 +4920,17 @@
             <a:r>
               <a:rPr lang="en-US" sz="2400" dirty="0"/>
               <a:t>One of the biggest “misuses” I see is the use of Epics as “attributes” or “categories” for issues (like Labels), or in place of Components, or occasionally as a Release</a:t>
+            </a:r>
+          </a:p>
+          <a:p>
+            <a:pPr marL="365760">
+              <a:spcBef>
+                <a:spcPts val="0"/>
+              </a:spcBef>
+            </a:pPr>
+            <a:r>
+              <a:rPr lang="en-US" sz="2400" dirty="0"/>
+              <a:t>some people just use Jira for tracking/visuals - understood</a:t>
             </a:r>
           </a:p>
           <a:p>
@@ -4931,7 +4957,7 @@
             </a:pPr>
             <a:r>
               <a:rPr lang="en-US" sz="2400" dirty="0"/>
-              <a:t>Epics: contain a large body of work such as a collection of stories/features</a:t>
+              <a:t>Epics: contain a large body of work with a purpose, such as a collection of related stories/features</a:t>
             </a:r>
           </a:p>
           <a:p>

</xml_diff>

<commit_message>
JIRAMETRICS-7 fixes to PPT based on feedback from audience Dec 4
</commit_message>
<xml_diff>
--- a/Jira Epic Thoughts and Jira Agile Tips and Tricks 1.pptx
+++ b/Jira Epic Thoughts and Jira Agile Tips and Tricks 1.pptx
@@ -318,7 +318,7 @@
           <a:p>
             <a:fld id="{799B01D3-E541-42FD-B1E6-9E7097F8E480}" type="datetimeFigureOut">
               <a:rPr lang="en-US" smtClean="0"/>
-              <a:t>11/26/2019</a:t>
+              <a:t>12/6/2019</a:t>
             </a:fld>
             <a:endParaRPr lang="en-US"/>
           </a:p>
@@ -486,7 +486,7 @@
           <a:p>
             <a:fld id="{799B01D3-E541-42FD-B1E6-9E7097F8E480}" type="datetimeFigureOut">
               <a:rPr lang="en-US" smtClean="0"/>
-              <a:t>11/26/2019</a:t>
+              <a:t>12/6/2019</a:t>
             </a:fld>
             <a:endParaRPr lang="en-US"/>
           </a:p>
@@ -664,7 +664,7 @@
           <a:p>
             <a:fld id="{799B01D3-E541-42FD-B1E6-9E7097F8E480}" type="datetimeFigureOut">
               <a:rPr lang="en-US" smtClean="0"/>
-              <a:t>11/26/2019</a:t>
+              <a:t>12/6/2019</a:t>
             </a:fld>
             <a:endParaRPr lang="en-US"/>
           </a:p>
@@ -816,7 +816,7 @@
           <a:p>
             <a:fld id="{799B01D3-E541-42FD-B1E6-9E7097F8E480}" type="datetimeFigureOut">
               <a:rPr lang="en-US" smtClean="0"/>
-              <a:t>11/26/2019</a:t>
+              <a:t>12/6/2019</a:t>
             </a:fld>
             <a:endParaRPr lang="en-US"/>
           </a:p>
@@ -1101,7 +1101,7 @@
           <a:p>
             <a:fld id="{799B01D3-E541-42FD-B1E6-9E7097F8E480}" type="datetimeFigureOut">
               <a:rPr lang="en-US" smtClean="0"/>
-              <a:t>11/26/2019</a:t>
+              <a:t>12/6/2019</a:t>
             </a:fld>
             <a:endParaRPr lang="en-US"/>
           </a:p>
@@ -1386,7 +1386,7 @@
           <a:p>
             <a:fld id="{799B01D3-E541-42FD-B1E6-9E7097F8E480}" type="datetimeFigureOut">
               <a:rPr lang="en-US" smtClean="0"/>
-              <a:t>11/26/2019</a:t>
+              <a:t>12/6/2019</a:t>
             </a:fld>
             <a:endParaRPr lang="en-US"/>
           </a:p>
@@ -1805,7 +1805,7 @@
           <a:p>
             <a:fld id="{799B01D3-E541-42FD-B1E6-9E7097F8E480}" type="datetimeFigureOut">
               <a:rPr lang="en-US" smtClean="0"/>
-              <a:t>11/26/2019</a:t>
+              <a:t>12/6/2019</a:t>
             </a:fld>
             <a:endParaRPr lang="en-US"/>
           </a:p>
@@ -1922,7 +1922,7 @@
           <a:p>
             <a:fld id="{799B01D3-E541-42FD-B1E6-9E7097F8E480}" type="datetimeFigureOut">
               <a:rPr lang="en-US" smtClean="0"/>
-              <a:t>11/26/2019</a:t>
+              <a:t>12/6/2019</a:t>
             </a:fld>
             <a:endParaRPr lang="en-US"/>
           </a:p>
@@ -2017,7 +2017,7 @@
           <a:p>
             <a:fld id="{799B01D3-E541-42FD-B1E6-9E7097F8E480}" type="datetimeFigureOut">
               <a:rPr lang="en-US" smtClean="0"/>
-              <a:t>11/26/2019</a:t>
+              <a:t>12/6/2019</a:t>
             </a:fld>
             <a:endParaRPr lang="en-US"/>
           </a:p>
@@ -2292,7 +2292,7 @@
           <a:p>
             <a:fld id="{799B01D3-E541-42FD-B1E6-9E7097F8E480}" type="datetimeFigureOut">
               <a:rPr lang="en-US" smtClean="0"/>
-              <a:t>11/26/2019</a:t>
+              <a:t>12/6/2019</a:t>
             </a:fld>
             <a:endParaRPr lang="en-US"/>
           </a:p>
@@ -2544,7 +2544,7 @@
           <a:p>
             <a:fld id="{799B01D3-E541-42FD-B1E6-9E7097F8E480}" type="datetimeFigureOut">
               <a:rPr lang="en-US" smtClean="0"/>
-              <a:t>11/26/2019</a:t>
+              <a:t>12/6/2019</a:t>
             </a:fld>
             <a:endParaRPr lang="en-US"/>
           </a:p>
@@ -2755,7 +2755,7 @@
           <a:p>
             <a:fld id="{799B01D3-E541-42FD-B1E6-9E7097F8E480}" type="datetimeFigureOut">
               <a:rPr lang="en-US" smtClean="0"/>
-              <a:t>11/26/2019</a:t>
+              <a:t>12/6/2019</a:t>
             </a:fld>
             <a:endParaRPr lang="en-US"/>
           </a:p>
@@ -3222,13 +3222,7 @@
               <a:rPr lang="en-US" sz="2025" b="1" dirty="0">
                 <a:hlinkClick r:id="rId2"/>
               </a:rPr>
-              <a:t>https://github.com/bobk</a:t>
-            </a:r>
-            <a:r>
-              <a:rPr lang="en-US" sz="2025" b="1">
-                <a:hlinkClick r:id="rId2"/>
-              </a:rPr>
-              <a:t>/jirapresentations</a:t>
+              <a:t>https://github.com/bobk/jirapresentations</a:t>
             </a:r>
             <a:br>
               <a:rPr lang="en-US" sz="2025" b="1" dirty="0"/>
@@ -3437,7 +3431,7 @@
         </p:spPr>
         <p:txBody>
           <a:bodyPr>
-            <a:normAutofit fontScale="70000" lnSpcReduction="20000"/>
+            <a:normAutofit fontScale="62500" lnSpcReduction="20000"/>
           </a:bodyPr>
           <a:lstStyle/>
           <a:p>
@@ -3446,19 +3440,50 @@
               <a:t>watchedIssues</a:t>
             </a:r>
             <a:r>
+              <a:rPr lang="en-US"/>
+              <a:t>()</a:t>
+            </a:r>
+            <a:endParaRPr lang="en-US" dirty="0"/>
+          </a:p>
+          <a:p>
+            <a:pPr lvl="1"/>
+            <a:r>
               <a:rPr lang="en-US" dirty="0"/>
-              <a:t>()</a:t>
+              <a:t>If you want to see all issues that you are watching but *not* assigned to:</a:t>
+            </a:r>
+          </a:p>
+          <a:p>
+            <a:pPr lvl="2"/>
+            <a:r>
+              <a:rPr lang="en-US" dirty="0"/>
+              <a:t>watcher = </a:t>
+            </a:r>
+            <a:r>
+              <a:rPr lang="en-US" dirty="0" err="1"/>
+              <a:t>currentUser</a:t>
+            </a:r>
+            <a:r>
+              <a:rPr lang="en-US" dirty="0"/>
+              <a:t>() AND (assignee is EMPTY OR assignee != </a:t>
+            </a:r>
+            <a:r>
+              <a:rPr lang="en-US" dirty="0" err="1"/>
+              <a:t>currentUser</a:t>
+            </a:r>
+            <a:r>
+              <a:rPr lang="en-US" dirty="0"/>
+              <a:t>())</a:t>
             </a:r>
           </a:p>
           <a:p>
             <a:pPr lvl="1"/>
             <a:r>
               <a:rPr lang="en-US" dirty="0"/>
-              <a:t>Use: “not in </a:t>
+              <a:t>Don’t just use “assignee != </a:t>
             </a:r>
             <a:r>
               <a:rPr lang="en-US" dirty="0" err="1"/>
-              <a:t>watchedIssues</a:t>
+              <a:t>currentUser</a:t>
             </a:r>
             <a:r>
               <a:rPr lang="en-US" dirty="0"/>
@@ -3466,25 +3491,10 @@
             </a:r>
           </a:p>
           <a:p>
-            <a:pPr lvl="1"/>
+            <a:pPr lvl="2"/>
             <a:r>
               <a:rPr lang="en-US" dirty="0"/>
-              <a:t>Instead of: “watcher != </a:t>
-            </a:r>
-            <a:r>
-              <a:rPr lang="en-US" dirty="0" err="1"/>
-              <a:t>currentUser</a:t>
-            </a:r>
-            <a:r>
-              <a:rPr lang="en-US" dirty="0"/>
-              <a:t>()” </a:t>
-            </a:r>
-          </a:p>
-          <a:p>
-            <a:pPr lvl="1"/>
-            <a:r>
-              <a:rPr lang="en-US" dirty="0"/>
-              <a:t>to avoid EMPTY issues</a:t>
+              <a:t>to avoid issues with Assignee = EMPTY</a:t>
             </a:r>
           </a:p>
           <a:p>
@@ -3733,7 +3743,7 @@
           </a:p>
           <a:p>
             <a:r>
-              <a:rPr lang="en-US" dirty="0"/>
+              <a:rPr lang="en-US" sz="2800" dirty="0"/>
               <a:t>CHANGED</a:t>
             </a:r>
           </a:p>
@@ -3877,14 +3887,14 @@
             <a:pPr lvl="1"/>
             <a:r>
               <a:rPr lang="en-US" sz="2400" dirty="0"/>
-              <a:t>Let’s you take an existing filter and add more conditions to it to further restrict it</a:t>
+              <a:t>Lets you take an existing filter and add more conditions to it to further restrict it</a:t>
             </a:r>
           </a:p>
           <a:p>
             <a:pPr lvl="1"/>
             <a:r>
               <a:rPr lang="en-US" sz="2400" dirty="0"/>
-              <a:t>So you can create one base filter and then use that in other filters</a:t>
+              <a:t>You can create one base filter and then use that in other filters, and if your base filter gets updated all the others do too</a:t>
             </a:r>
           </a:p>
           <a:p>
@@ -4918,7 +4928,7 @@
               </a:spcBef>
             </a:pPr>
             <a:r>
-              <a:rPr lang="en-US" sz="2400" dirty="0"/>
+              <a:rPr lang="en-US" sz="2000" dirty="0"/>
               <a:t>One of the biggest “misuses” I see is the use of Epics as “attributes” or “categories” for issues (like Labels), or in place of Components, or occasionally as a Release</a:t>
             </a:r>
           </a:p>
@@ -4929,8 +4939,8 @@
               </a:spcBef>
             </a:pPr>
             <a:r>
-              <a:rPr lang="en-US" sz="2400" dirty="0"/>
-              <a:t>some people just use Jira for tracking/visuals - understood</a:t>
+              <a:rPr lang="en-US" sz="2000" dirty="0"/>
+              <a:t>This is not a major crime - some people just use Jira for tracking/visuals – they also may like the visual display of Epic information - understood</a:t>
             </a:r>
           </a:p>
           <a:p>
@@ -4940,12 +4950,12 @@
               </a:spcBef>
             </a:pPr>
             <a:r>
-              <a:rPr lang="en-US" sz="1800" dirty="0">
+              <a:rPr lang="en-US" sz="1600" dirty="0">
                 <a:hlinkClick r:id="rId2"/>
               </a:rPr>
               <a:t>https://www.atlassian.com/agile/project-management/epics-stories-themes</a:t>
             </a:r>
-            <a:endParaRPr lang="en-US" sz="1800" dirty="0"/>
+            <a:endParaRPr lang="en-US" sz="1600" dirty="0"/>
           </a:p>
           <a:p>
             <a:pPr marL="342900" lvl="1" indent="-342900">
@@ -4956,7 +4966,7 @@
               <a:buChar char="•"/>
             </a:pPr>
             <a:r>
-              <a:rPr lang="en-US" sz="2400" dirty="0"/>
+              <a:rPr lang="en-US" sz="2000" dirty="0"/>
               <a:t>Epics: contain a large body of work with a purpose, such as a collection of related stories/features</a:t>
             </a:r>
           </a:p>
@@ -4969,7 +4979,7 @@
               <a:buChar char="•"/>
             </a:pPr>
             <a:r>
-              <a:rPr lang="en-US" sz="2400" dirty="0"/>
+              <a:rPr lang="en-US" sz="2000" dirty="0"/>
               <a:t>stretch through a finite number of Sprints</a:t>
             </a:r>
           </a:p>
@@ -4982,7 +4992,7 @@
               <a:buChar char="•"/>
             </a:pPr>
             <a:r>
-              <a:rPr lang="en-US" sz="2400" dirty="0"/>
+              <a:rPr lang="en-US" sz="2000" dirty="0"/>
               <a:t>contain a finite (but possibly changing) number of issues, each of which is a finite amount of work</a:t>
             </a:r>
           </a:p>
@@ -4995,15 +5005,23 @@
               <a:buChar char="•"/>
             </a:pPr>
             <a:r>
-              <a:rPr lang="en-US" sz="2400" dirty="0"/>
+              <a:rPr lang="en-US" sz="2000" dirty="0">
+                <a:solidFill>
+                  <a:srgbClr val="FF0000"/>
+                </a:solidFill>
+              </a:rPr>
               <a:t>therefore Epics are finite - </a:t>
             </a:r>
             <a:r>
-              <a:rPr lang="en-US" sz="2400" b="1" dirty="0"/>
+              <a:rPr lang="en-US" sz="2000" b="1" dirty="0">
+                <a:solidFill>
+                  <a:srgbClr val="FF0000"/>
+                </a:solidFill>
+              </a:rPr>
               <a:t>they have an end</a:t>
             </a:r>
             <a:r>
-              <a:rPr lang="en-US" sz="2400" dirty="0"/>
+              <a:rPr lang="en-US" sz="2000" dirty="0"/>
               <a:t> (even though you may not yet know when that is)</a:t>
             </a:r>
           </a:p>
@@ -5016,7 +5034,7 @@
               <a:buChar char="•"/>
             </a:pPr>
             <a:r>
-              <a:rPr lang="en-US" sz="2400" dirty="0"/>
+              <a:rPr lang="en-US" sz="2000" dirty="0"/>
               <a:t>If the thing you are trying to group by does not have an end, then it should not be an Epic</a:t>
             </a:r>
           </a:p>
@@ -5122,7 +5140,7 @@
             </a:r>
             <a:r>
               <a:rPr lang="en-US" sz="2400" dirty="0"/>
-              <a:t>If you use Epics like a Label, Component, category or attribute you lose some semantics and Jira charting capabilities (e.g. Epic Reports, Epic Burndown) become less meaningful</a:t>
+              <a:t>If you use Epics like a Label, Component, category or attribute you lose some semantics and Jira charting capabilities (e.g. reports like Epic Burndown) become less meaningful</a:t>
             </a:r>
           </a:p>
           <a:p>
@@ -5300,7 +5318,7 @@
         </p:spPr>
         <p:txBody>
           <a:bodyPr>
-            <a:normAutofit fontScale="85000" lnSpcReduction="10000"/>
+            <a:normAutofit fontScale="85000" lnSpcReduction="20000"/>
           </a:bodyPr>
           <a:lstStyle/>
           <a:p>
@@ -5313,7 +5331,15 @@
             <a:pPr lvl="1"/>
             <a:r>
               <a:rPr lang="en-US" dirty="0"/>
-              <a:t>Consider using Labels first, otherwise use a VERY SHORT prefix in the Epic Name surrounded by separators (brackets or parentheses) “[]” – can be LIKE-queried with ~</a:t>
+              <a:t>Consider using Labels first, otherwise use a VERY SHORT prefix in the Epic Name surrounded by separators (brackets or parentheses) “[]” – can be LIKE-queried with ~ and with </a:t>
+            </a:r>
+            <a:r>
+              <a:rPr lang="en-US" dirty="0" err="1"/>
+              <a:t>ScriptRunner</a:t>
+            </a:r>
+            <a:r>
+              <a:rPr lang="en-US" dirty="0"/>
+              <a:t> you can then identify issues</a:t>
             </a:r>
           </a:p>
           <a:p>
@@ -5332,8 +5358,16 @@
           </a:p>
           <a:p>
             <a:r>
+              <a:rPr lang="en-US" dirty="0">
+                <a:solidFill>
+                  <a:srgbClr val="FF0000"/>
+                </a:solidFill>
+              </a:rPr>
+              <a:t>All of the built-in Jira reporting works best when you use Epics and Sprints the way they were intended to be used</a:t>
+            </a:r>
+            <a:r>
               <a:rPr lang="en-US" dirty="0"/>
-              <a:t>All of the built-in Jira reporting works best when you use Epics and Sprints the way they were intended to be used – including summing up Story Points or Logged Time by Epic (plugin or REST API)</a:t>
+              <a:t> – including summing up Story Points or Logged Time by Epic (plugin or REST API)</a:t>
             </a:r>
           </a:p>
           <a:p>
@@ -5430,53 +5464,58 @@
             <p:ph idx="1"/>
           </p:nvPr>
         </p:nvSpPr>
-        <p:spPr/>
+        <p:spPr>
+          <a:xfrm>
+            <a:off x="381000" y="1295400"/>
+            <a:ext cx="8382000" cy="5287962"/>
+          </a:xfrm>
+        </p:spPr>
         <p:txBody>
           <a:bodyPr>
-            <a:normAutofit fontScale="62500" lnSpcReduction="20000"/>
+            <a:normAutofit/>
           </a:bodyPr>
           <a:lstStyle/>
           <a:p>
             <a:r>
-              <a:rPr lang="en-US" dirty="0"/>
+              <a:rPr lang="en-US" sz="1800" dirty="0"/>
               <a:t>Components - generally intended to represent physical components/modules/stack layers</a:t>
             </a:r>
           </a:p>
           <a:p>
             <a:r>
-              <a:rPr lang="en-US" dirty="0"/>
-              <a:t>Sometime Components are used as assigned team names or even sub-projects, this is not best practice either, the fact that sometimes dev teams are by Component and that Components have an auto-assign workflow to a Component lead contributes to this misuse</a:t>
-            </a:r>
-          </a:p>
-          <a:p>
-            <a:r>
-              <a:rPr lang="en-US" dirty="0"/>
+              <a:rPr lang="en-US" sz="1800" dirty="0"/>
+              <a:t>Sometime Components are used as team names or even sub-projects, this is not best practice either, sometimes dev teams are by Component and that Components have an auto-assign workflow to a Component lead contributes to this misuse</a:t>
+            </a:r>
+          </a:p>
+          <a:p>
+            <a:r>
+              <a:rPr lang="en-US" sz="1800" dirty="0"/>
               <a:t>Can organize Components in a namespace (e.g. “Database/Server”, “Database/API”, etc.), but cannot search on subsets of them unless you use IN with the whole list, or something like </a:t>
             </a:r>
             <a:r>
-              <a:rPr lang="en-US" dirty="0" err="1"/>
+              <a:rPr lang="en-US" sz="1800" dirty="0" err="1"/>
               <a:t>ScriptRunner</a:t>
             </a:r>
             <a:r>
-              <a:rPr lang="en-US" dirty="0"/>
+              <a:rPr lang="en-US" sz="1800" dirty="0"/>
               <a:t>, or the REST API</a:t>
             </a:r>
           </a:p>
           <a:p>
             <a:r>
-              <a:rPr lang="en-US" dirty="0"/>
+              <a:rPr lang="en-US" sz="1800" dirty="0"/>
               <a:t>Components cannot span projects (but you can assign the same name to Components in &gt; 1 project), people sometimes also misuse Epics like Components for this reason</a:t>
             </a:r>
           </a:p>
           <a:p>
             <a:r>
-              <a:rPr lang="en-US" dirty="0"/>
+              <a:rPr lang="en-US" sz="1800" dirty="0"/>
               <a:t>Don’t be vague, be granular – use “Database API Layer” and “Database Server” instead of just “DB”, but don’t overdo it</a:t>
             </a:r>
           </a:p>
           <a:p>
             <a:r>
-              <a:rPr lang="en-US" dirty="0">
+              <a:rPr lang="en-US" sz="1800" dirty="0">
                 <a:solidFill>
                   <a:srgbClr val="FF0000"/>
                 </a:solidFill>
@@ -5484,28 +5523,14 @@
               <a:t>Why is this important (for Agile)?</a:t>
             </a:r>
             <a:r>
-              <a:rPr lang="en-US" dirty="0"/>
+              <a:rPr lang="en-US" sz="1800" dirty="0"/>
               <a:t> As per the previous slide, using Components correctly frees you up to use Epics correctly</a:t>
             </a:r>
-            <a:endParaRPr lang="en-US" dirty="0">
+            <a:endParaRPr lang="en-US" sz="1800" dirty="0">
               <a:solidFill>
                 <a:srgbClr val="FF0000"/>
               </a:solidFill>
             </a:endParaRPr>
-          </a:p>
-          <a:p>
-            <a:endParaRPr lang="en-US" dirty="0"/>
-          </a:p>
-          <a:p>
-            <a:pPr lvl="1"/>
-            <a:endParaRPr lang="en-US" dirty="0"/>
-          </a:p>
-          <a:p>
-            <a:pPr lvl="1"/>
-            <a:endParaRPr lang="en-US" dirty="0"/>
-          </a:p>
-          <a:p>
-            <a:endParaRPr lang="en-US" dirty="0"/>
           </a:p>
         </p:txBody>
       </p:sp>
@@ -5631,8 +5656,13 @@
             <a:pPr lvl="1"/>
             <a:r>
               <a:rPr lang="en-US" sz="1600" dirty="0"/>
-              <a:t>Login vs. login,  User vs. user, Database vs. DB</a:t>
-            </a:r>
+              <a:t>Login vs. login,  User vs. user, Database vs. DB vs. </a:t>
+            </a:r>
+            <a:r>
+              <a:rPr lang="en-US" sz="1600" dirty="0" err="1"/>
+              <a:t>DataBase</a:t>
+            </a:r>
+            <a:endParaRPr lang="en-US" sz="1600" dirty="0"/>
           </a:p>
           <a:p>
             <a:r>

</xml_diff>